<commit_message>
Fix spell in slide template.
</commit_message>
<xml_diff>
--- a/media/micsecs-slides-last-name-template.pptx
+++ b/media/micsecs-slides-last-name-template.pptx
@@ -200,7 +200,7 @@
           <a:p>
             <a:fld id="{728CD363-B559-4380-8A4E-32B3C228E6A9}" type="datetimeFigureOut">
               <a:rPr lang="ru-RU" smtClean="0"/>
-              <a:t>08.12.2020</a:t>
+              <a:t>09.12.2020</a:t>
             </a:fld>
             <a:endParaRPr lang="ru-RU"/>
           </a:p>
@@ -624,7 +624,7 @@
           <a:p>
             <a:fld id="{013F45CF-4659-4C8B-A1F4-DA1819C4D704}" type="datetime1">
               <a:rPr lang="ru-RU" smtClean="0"/>
-              <a:t>08.12.2020</a:t>
+              <a:t>09.12.2020</a:t>
             </a:fld>
             <a:endParaRPr lang="ru-RU" dirty="0"/>
           </a:p>
@@ -857,7 +857,7 @@
           <a:p>
             <a:fld id="{7EC0BBD9-B90A-475D-B2BD-ABBF56CB14C4}" type="datetime1">
               <a:rPr lang="ru-RU" smtClean="0"/>
-              <a:t>08.12.2020</a:t>
+              <a:t>09.12.2020</a:t>
             </a:fld>
             <a:endParaRPr lang="ru-RU" dirty="0"/>
           </a:p>
@@ -1150,7 +1150,7 @@
           <a:p>
             <a:fld id="{12DE77DF-9F3C-47B3-9A81-593D6194E612}" type="datetime1">
               <a:rPr lang="ru-RU" smtClean="0"/>
-              <a:t>08.12.2020</a:t>
+              <a:t>09.12.2020</a:t>
             </a:fld>
             <a:endParaRPr lang="ru-RU" dirty="0"/>
           </a:p>
@@ -1446,7 +1446,7 @@
           <a:p>
             <a:fld id="{F17ED80D-0F5D-4F2A-B7C5-470CCB86B008}" type="datetime1">
               <a:rPr lang="ru-RU" smtClean="0"/>
-              <a:t>08.12.2020</a:t>
+              <a:t>09.12.2020</a:t>
             </a:fld>
             <a:endParaRPr lang="ru-RU" dirty="0"/>
           </a:p>
@@ -1884,7 +1884,7 @@
           <a:p>
             <a:fld id="{01210095-AD7E-4547-AC5C-025A5A99A441}" type="datetime1">
               <a:rPr lang="ru-RU" smtClean="0"/>
-              <a:t>08.12.2020</a:t>
+              <a:t>09.12.2020</a:t>
             </a:fld>
             <a:endParaRPr lang="ru-RU" dirty="0"/>
           </a:p>
@@ -2014,7 +2014,7 @@
           <a:p>
             <a:fld id="{B6C76023-4415-440C-B884-D85AD4E64EF4}" type="datetime1">
               <a:rPr lang="ru-RU" smtClean="0"/>
-              <a:t>08.12.2020</a:t>
+              <a:t>09.12.2020</a:t>
             </a:fld>
             <a:endParaRPr lang="ru-RU" dirty="0"/>
           </a:p>
@@ -2324,7 +2324,7 @@
           <a:p>
             <a:fld id="{4FB3A016-B143-4928-807E-12F469A3601D}" type="datetime1">
               <a:rPr lang="ru-RU" smtClean="0"/>
-              <a:t>08.12.2020</a:t>
+              <a:t>09.12.2020</a:t>
             </a:fld>
             <a:endParaRPr lang="ru-RU" dirty="0"/>
           </a:p>
@@ -2583,7 +2583,7 @@
           <a:p>
             <a:fld id="{7A0D2717-A161-4CCA-BCA4-3A6349CB7BE2}" type="datetime1">
               <a:rPr lang="ru-RU" smtClean="0"/>
-              <a:t>08.12.2020</a:t>
+              <a:t>09.12.2020</a:t>
             </a:fld>
             <a:endParaRPr lang="ru-RU"/>
           </a:p>
@@ -3411,8 +3411,12 @@
           <a:lstStyle/>
           <a:p>
             <a:r>
+              <a:rPr lang="en-RU"/>
+              <a:t>Contact information</a:t>
+            </a:r>
+            <a:r>
               <a:rPr lang="en-RU" dirty="0"/>
-              <a:t>Contact informaion: email@besthosting.org, etc.</a:t>
+              <a:t>: email@besthosting.org, etc.</a:t>
             </a:r>
           </a:p>
         </p:txBody>

</xml_diff>